<commit_message>
Mise à jour des fichiers sur Hadoop
</commit_message>
<xml_diff>
--- a/slides/Hadoop.pptx
+++ b/slides/Hadoop.pptx
@@ -3724,7 +3724,7 @@
         <p:spPr>
           <a:xfrm>
             <a:off x="838200" y="1825625"/>
-            <a:ext cx="10515600" cy="4667250"/>
+            <a:ext cx="10696662" cy="4667250"/>
           </a:xfrm>
         </p:spPr>
         <p:txBody>
@@ -3742,7 +3742,7 @@
             <a:pPr lvl="1"/>
             <a:r>
               <a:rPr lang="fr-FR" dirty="0"/>
-              <a:t>Les entrées/sorties et les échanges de données sont basés sur des fichiers du HDFS</a:t>
+              <a:t>Les entrées/sorties et les échanges de données reposent sur des fichiers du HDFS</a:t>
             </a:r>
           </a:p>
           <a:p>
@@ -4935,9 +4935,39 @@
         </p:blipFill>
         <p:spPr>
           <a:xfrm>
-            <a:off x="7843706" y="1825624"/>
+            <a:off x="7855590" y="3582984"/>
             <a:ext cx="3766658" cy="2909891"/>
           </a:xfrm>
+        </p:spPr>
+      </p:pic>
+      <p:pic>
+        <p:nvPicPr>
+          <p:cNvPr id="8" name="Image 7">
+            <a:extLst>
+              <a:ext uri="{FF2B5EF4-FFF2-40B4-BE49-F238E27FC236}">
+                <a16:creationId xmlns:a16="http://schemas.microsoft.com/office/drawing/2014/main" id="{06F82E3B-225D-40AB-9F79-386496A964A0}"/>
+              </a:ext>
+            </a:extLst>
+          </p:cNvPr>
+          <p:cNvPicPr>
+            <a:picLocks noChangeAspect="1"/>
+          </p:cNvPicPr>
+          <p:nvPr/>
+        </p:nvPicPr>
+        <p:blipFill>
+          <a:blip r:embed="rId3"/>
+          <a:stretch>
+            <a:fillRect/>
+          </a:stretch>
+        </p:blipFill>
+        <p:spPr>
+          <a:xfrm>
+            <a:off x="7855590" y="1562250"/>
+            <a:ext cx="3278130" cy="1866750"/>
+          </a:xfrm>
+          <a:prstGeom prst="rect">
+            <a:avLst/>
+          </a:prstGeom>
         </p:spPr>
       </p:pic>
     </p:spTree>
@@ -5776,7 +5806,7 @@
             <a:pPr lvl="2"/>
             <a:r>
               <a:rPr lang="fr-FR" dirty="0"/>
-              <a:t>Accès en lecture : détermination du bloc le plus proche du client</a:t>
+              <a:t>Accès en lecture : détermination de la réplique du bloc la plus proche du client</a:t>
             </a:r>
           </a:p>
           <a:p>
@@ -5944,25 +5974,18 @@
           <a:p>
             <a:pPr lvl="1"/>
             <a:r>
+              <a:rPr lang="fr-FR" dirty="0" err="1">
+                <a:latin typeface="Courier New" panose="02070309020205020404" pitchFamily="49" charset="0"/>
+                <a:cs typeface="Courier New" panose="02070309020205020404" pitchFamily="49" charset="0"/>
+              </a:rPr>
+              <a:t>hadoop</a:t>
+            </a:r>
+            <a:r>
               <a:rPr lang="fr-FR" dirty="0">
                 <a:latin typeface="Courier New" panose="02070309020205020404" pitchFamily="49" charset="0"/>
                 <a:cs typeface="Courier New" panose="02070309020205020404" pitchFamily="49" charset="0"/>
               </a:rPr>
-              <a:t>$HADOOP_PATH/bin/</a:t>
-            </a:r>
-            <a:r>
-              <a:rPr lang="fr-FR" dirty="0" err="1">
-                <a:latin typeface="Courier New" panose="02070309020205020404" pitchFamily="49" charset="0"/>
-                <a:cs typeface="Courier New" panose="02070309020205020404" pitchFamily="49" charset="0"/>
-              </a:rPr>
-              <a:t>hadoop</a:t>
-            </a:r>
-            <a:r>
-              <a:rPr lang="fr-FR" dirty="0">
-                <a:latin typeface="Courier New" panose="02070309020205020404" pitchFamily="49" charset="0"/>
-                <a:cs typeface="Courier New" panose="02070309020205020404" pitchFamily="49" charset="0"/>
-              </a:rPr>
-              <a:t>  </a:t>
+              <a:t> </a:t>
             </a:r>
             <a:r>
               <a:rPr lang="fr-FR" dirty="0" err="1">

</xml_diff>